<commit_message>
add content for first two weeks
</commit_message>
<xml_diff>
--- a/Variables/Variables.pptx
+++ b/Variables/Variables.pptx
@@ -219,7 +219,7 @@
           <a:p>
             <a:fld id="{19104133-B5B0-4351-8158-4F0E5EB1E2BF}" type="datetimeFigureOut">
               <a:rPr lang="en-US" smtClean="0"/>
-              <a:t>2/17/2020</a:t>
+              <a:t>7/22/2020</a:t>
             </a:fld>
             <a:endParaRPr lang="en-US"/>
           </a:p>
@@ -2032,7 +2032,7 @@
             <a:fld id="{1C2D31DE-C454-491C-B5C3-F097855E3DF7}" type="datetime4">
               <a:rPr lang="en-US" smtClean="0"/>
               <a:pPr/>
-              <a:t>February 17, 2020</a:t>
+              <a:t>July 22, 2020</a:t>
             </a:fld>
             <a:endParaRPr lang="en-US" dirty="0"/>
           </a:p>
@@ -5432,7 +5432,7 @@
           <a:p>
             <a:fld id="{5958763E-B898-436D-883D-03711491D54A}" type="datetimeFigureOut">
               <a:rPr lang="en-US" smtClean="0"/>
-              <a:t>2/17/2020</a:t>
+              <a:t>7/22/2020</a:t>
             </a:fld>
             <a:endParaRPr lang="en-US"/>
           </a:p>
@@ -5633,7 +5633,7 @@
           <a:p>
             <a:fld id="{5958763E-B898-436D-883D-03711491D54A}" type="datetimeFigureOut">
               <a:rPr lang="en-US" smtClean="0"/>
-              <a:t>2/17/2020</a:t>
+              <a:t>7/22/2020</a:t>
             </a:fld>
             <a:endParaRPr lang="en-US"/>
           </a:p>
@@ -5890,7 +5890,7 @@
           <a:p>
             <a:fld id="{5958763E-B898-436D-883D-03711491D54A}" type="datetimeFigureOut">
               <a:rPr lang="en-US" smtClean="0"/>
-              <a:t>2/17/2020</a:t>
+              <a:t>7/22/2020</a:t>
             </a:fld>
             <a:endParaRPr lang="en-US"/>
           </a:p>
@@ -6245,7 +6245,7 @@
           <a:p>
             <a:fld id="{5958763E-B898-436D-883D-03711491D54A}" type="datetimeFigureOut">
               <a:rPr lang="en-US" smtClean="0"/>
-              <a:t>2/17/2020</a:t>
+              <a:t>7/22/2020</a:t>
             </a:fld>
             <a:endParaRPr lang="en-US"/>
           </a:p>
@@ -6668,7 +6668,7 @@
           <a:p>
             <a:fld id="{5958763E-B898-436D-883D-03711491D54A}" type="datetimeFigureOut">
               <a:rPr lang="en-US" smtClean="0"/>
-              <a:t>2/17/2020</a:t>
+              <a:t>7/22/2020</a:t>
             </a:fld>
             <a:endParaRPr lang="en-US"/>
           </a:p>
@@ -7176,7 +7176,7 @@
           <a:p>
             <a:fld id="{5958763E-B898-436D-883D-03711491D54A}" type="datetimeFigureOut">
               <a:rPr lang="en-US" smtClean="0"/>
-              <a:t>2/17/2020</a:t>
+              <a:t>7/22/2020</a:t>
             </a:fld>
             <a:endParaRPr lang="en-US"/>
           </a:p>
@@ -7634,7 +7634,7 @@
           <a:p>
             <a:fld id="{5958763E-B898-436D-883D-03711491D54A}" type="datetimeFigureOut">
               <a:rPr lang="en-US" smtClean="0"/>
-              <a:t>2/17/2020</a:t>
+              <a:t>7/22/2020</a:t>
             </a:fld>
             <a:endParaRPr lang="en-US"/>
           </a:p>
@@ -8252,7 +8252,7 @@
           <a:p>
             <a:fld id="{5958763E-B898-436D-883D-03711491D54A}" type="datetimeFigureOut">
               <a:rPr lang="en-US" smtClean="0"/>
-              <a:t>2/17/2020</a:t>
+              <a:t>7/22/2020</a:t>
             </a:fld>
             <a:endParaRPr lang="en-US"/>
           </a:p>
@@ -9030,7 +9030,7 @@
           <a:p>
             <a:fld id="{5958763E-B898-436D-883D-03711491D54A}" type="datetimeFigureOut">
               <a:rPr lang="en-US" smtClean="0"/>
-              <a:t>2/17/2020</a:t>
+              <a:t>7/22/2020</a:t>
             </a:fld>
             <a:endParaRPr lang="en-US"/>
           </a:p>
@@ -9141,7 +9141,7 @@
           <a:p>
             <a:fld id="{5958763E-B898-436D-883D-03711491D54A}" type="datetimeFigureOut">
               <a:rPr lang="en-US" smtClean="0"/>
-              <a:t>2/17/2020</a:t>
+              <a:t>7/22/2020</a:t>
             </a:fld>
             <a:endParaRPr lang="en-US"/>
           </a:p>
@@ -9483,7 +9483,7 @@
             <a:fld id="{1C2D31DE-C454-491C-B5C3-F097855E3DF7}" type="datetime4">
               <a:rPr lang="en-US" smtClean="0"/>
               <a:pPr/>
-              <a:t>February 17, 2020</a:t>
+              <a:t>July 22, 2020</a:t>
             </a:fld>
             <a:endParaRPr lang="en-US" dirty="0"/>
           </a:p>
@@ -12643,7 +12643,7 @@
           <a:p>
             <a:fld id="{5958763E-B898-436D-883D-03711491D54A}" type="datetimeFigureOut">
               <a:rPr lang="en-US" smtClean="0"/>
-              <a:t>2/17/2020</a:t>
+              <a:t>7/22/2020</a:t>
             </a:fld>
             <a:endParaRPr lang="en-US"/>
           </a:p>
@@ -12774,7 +12774,7 @@
           <a:p>
             <a:fld id="{5958763E-B898-436D-883D-03711491D54A}" type="datetimeFigureOut">
               <a:rPr lang="en-US" smtClean="0"/>
-              <a:t>2/17/2020</a:t>
+              <a:t>7/22/2020</a:t>
             </a:fld>
             <a:endParaRPr lang="en-US"/>
           </a:p>
@@ -12905,7 +12905,7 @@
           <a:p>
             <a:fld id="{5958763E-B898-436D-883D-03711491D54A}" type="datetimeFigureOut">
               <a:rPr lang="en-US" smtClean="0"/>
-              <a:t>2/17/2020</a:t>
+              <a:t>7/22/2020</a:t>
             </a:fld>
             <a:endParaRPr lang="en-US"/>
           </a:p>
@@ -13036,7 +13036,7 @@
           <a:p>
             <a:fld id="{5958763E-B898-436D-883D-03711491D54A}" type="datetimeFigureOut">
               <a:rPr lang="en-US" smtClean="0"/>
-              <a:t>2/17/2020</a:t>
+              <a:t>7/22/2020</a:t>
             </a:fld>
             <a:endParaRPr lang="en-US"/>
           </a:p>
@@ -13167,7 +13167,7 @@
           <a:p>
             <a:fld id="{5958763E-B898-436D-883D-03711491D54A}" type="datetimeFigureOut">
               <a:rPr lang="en-US" smtClean="0"/>
-              <a:t>2/17/2020</a:t>
+              <a:t>7/22/2020</a:t>
             </a:fld>
             <a:endParaRPr lang="en-US"/>
           </a:p>
@@ -13298,7 +13298,7 @@
           <a:p>
             <a:fld id="{5958763E-B898-436D-883D-03711491D54A}" type="datetimeFigureOut">
               <a:rPr lang="en-US" smtClean="0"/>
-              <a:t>2/17/2020</a:t>
+              <a:t>7/22/2020</a:t>
             </a:fld>
             <a:endParaRPr lang="en-US"/>
           </a:p>
@@ -13429,7 +13429,7 @@
           <a:p>
             <a:fld id="{5958763E-B898-436D-883D-03711491D54A}" type="datetimeFigureOut">
               <a:rPr lang="en-US" smtClean="0"/>
-              <a:t>2/17/2020</a:t>
+              <a:t>7/22/2020</a:t>
             </a:fld>
             <a:endParaRPr lang="en-US"/>
           </a:p>
@@ -13560,7 +13560,7 @@
           <a:p>
             <a:fld id="{5958763E-B898-436D-883D-03711491D54A}" type="datetimeFigureOut">
               <a:rPr lang="en-US" smtClean="0"/>
-              <a:t>2/17/2020</a:t>
+              <a:t>7/22/2020</a:t>
             </a:fld>
             <a:endParaRPr lang="en-US"/>
           </a:p>
@@ -13700,7 +13700,7 @@
           <a:p>
             <a:fld id="{5958763E-B898-436D-883D-03711491D54A}" type="datetimeFigureOut">
               <a:rPr lang="en-US" smtClean="0"/>
-              <a:t>2/17/2020</a:t>
+              <a:t>7/22/2020</a:t>
             </a:fld>
             <a:endParaRPr lang="en-US"/>
           </a:p>
@@ -17061,7 +17061,7 @@
             <a:fld id="{1C2D31DE-C454-491C-B5C3-F097855E3DF7}" type="datetime4">
               <a:rPr lang="en-US" smtClean="0"/>
               <a:pPr/>
-              <a:t>February 17, 2020</a:t>
+              <a:t>July 22, 2020</a:t>
             </a:fld>
             <a:endParaRPr lang="en-US" dirty="0"/>
           </a:p>
@@ -29306,7 +29306,7 @@
           <a:p>
             <a:fld id="{5958763E-B898-436D-883D-03711491D54A}" type="datetimeFigureOut">
               <a:rPr lang="en-US" smtClean="0"/>
-              <a:t>2/17/2020</a:t>
+              <a:t>7/22/2020</a:t>
             </a:fld>
             <a:endParaRPr lang="en-US"/>
           </a:p>
@@ -29715,7 +29715,7 @@
           <a:p>
             <a:fld id="{5958763E-B898-436D-883D-03711491D54A}" type="datetimeFigureOut">
               <a:rPr lang="en-US" smtClean="0"/>
-              <a:t>2/17/2020</a:t>
+              <a:t>7/22/2020</a:t>
             </a:fld>
             <a:endParaRPr lang="en-US"/>
           </a:p>
@@ -30016,7 +30016,7 @@
           <a:p>
             <a:fld id="{5958763E-B898-436D-883D-03711491D54A}" type="datetimeFigureOut">
               <a:rPr lang="en-US" smtClean="0"/>
-              <a:t>2/17/2020</a:t>
+              <a:t>7/22/2020</a:t>
             </a:fld>
             <a:endParaRPr lang="en-US"/>
           </a:p>
@@ -30224,7 +30224,7 @@
           <a:p>
             <a:fld id="{5958763E-B898-436D-883D-03711491D54A}" type="datetimeFigureOut">
               <a:rPr lang="en-US" smtClean="0"/>
-              <a:t>2/17/2020</a:t>
+              <a:t>7/22/2020</a:t>
             </a:fld>
             <a:endParaRPr lang="en-US"/>
           </a:p>
@@ -30492,7 +30492,7 @@
           <a:p>
             <a:fld id="{5958763E-B898-436D-883D-03711491D54A}" type="datetimeFigureOut">
               <a:rPr lang="en-US" smtClean="0"/>
-              <a:t>2/17/2020</a:t>
+              <a:t>7/22/2020</a:t>
             </a:fld>
             <a:endParaRPr lang="en-US"/>
           </a:p>
@@ -31009,7 +31009,7 @@
           <a:p>
             <a:fld id="{5958763E-B898-436D-883D-03711491D54A}" type="datetimeFigureOut">
               <a:rPr lang="en-US" smtClean="0"/>
-              <a:t>2/17/2020</a:t>
+              <a:t>7/22/2020</a:t>
             </a:fld>
             <a:endParaRPr lang="en-US"/>
           </a:p>
@@ -31497,7 +31497,7 @@
           <a:p>
             <a:fld id="{5958763E-B898-436D-883D-03711491D54A}" type="datetimeFigureOut">
               <a:rPr lang="en-US" smtClean="0"/>
-              <a:t>2/17/2020</a:t>
+              <a:t>7/22/2020</a:t>
             </a:fld>
             <a:endParaRPr lang="en-US"/>
           </a:p>
@@ -32323,7 +32323,7 @@
           <a:p>
             <a:fld id="{5958763E-B898-436D-883D-03711491D54A}" type="datetimeFigureOut">
               <a:rPr lang="en-US" smtClean="0"/>
-              <a:t>2/17/2020</a:t>
+              <a:t>7/22/2020</a:t>
             </a:fld>
             <a:endParaRPr lang="en-US"/>
           </a:p>
@@ -32531,7 +32531,7 @@
           <a:p>
             <a:fld id="{5958763E-B898-436D-883D-03711491D54A}" type="datetimeFigureOut">
               <a:rPr lang="en-US" smtClean="0"/>
-              <a:t>2/17/2020</a:t>
+              <a:t>7/22/2020</a:t>
             </a:fld>
             <a:endParaRPr lang="en-US"/>
           </a:p>
@@ -32873,7 +32873,7 @@
           <a:p>
             <a:fld id="{5958763E-B898-436D-883D-03711491D54A}" type="datetimeFigureOut">
               <a:rPr lang="en-US" smtClean="0"/>
-              <a:t>2/17/2020</a:t>
+              <a:t>7/22/2020</a:t>
             </a:fld>
             <a:endParaRPr lang="en-US"/>
           </a:p>
@@ -33110,7 +33110,7 @@
           <a:p>
             <a:fld id="{5958763E-B898-436D-883D-03711491D54A}" type="datetimeFigureOut">
               <a:rPr lang="en-US" smtClean="0"/>
-              <a:t>2/17/2020</a:t>
+              <a:t>7/22/2020</a:t>
             </a:fld>
             <a:endParaRPr lang="en-US"/>
           </a:p>
@@ -33361,7 +33361,7 @@
           <a:p>
             <a:fld id="{5958763E-B898-436D-883D-03711491D54A}" type="datetimeFigureOut">
               <a:rPr lang="en-US" smtClean="0"/>
-              <a:t>2/17/2020</a:t>
+              <a:t>7/22/2020</a:t>
             </a:fld>
             <a:endParaRPr lang="en-US"/>
           </a:p>
@@ -38128,21 +38128,6 @@
               </a:rPr>
               <a:t>How old are you?</a:t>
             </a:r>
-            <a:endParaRPr lang="en-US" sz="3200" dirty="0" smtClean="0">
-              <a:gradFill>
-                <a:gsLst>
-                  <a:gs pos="0">
-                    <a:srgbClr val="FFFFFF"/>
-                  </a:gs>
-                  <a:gs pos="100000">
-                    <a:srgbClr val="FFFFFF"/>
-                  </a:gs>
-                </a:gsLst>
-                <a:lin ang="5400000" scaled="0"/>
-              </a:gradFill>
-              <a:ea typeface="Segoe UI" pitchFamily="34" charset="0"/>
-              <a:cs typeface="Segoe UI" pitchFamily="34" charset="0"/>
-            </a:endParaRPr>
           </a:p>
         </p:txBody>
       </p:sp>
@@ -38262,21 +38247,6 @@
               </a:rPr>
               <a:t> years old!</a:t>
             </a:r>
-            <a:endParaRPr lang="en-US" sz="3200" dirty="0" smtClean="0">
-              <a:gradFill>
-                <a:gsLst>
-                  <a:gs pos="0">
-                    <a:srgbClr val="FFFFFF"/>
-                  </a:gs>
-                  <a:gs pos="100000">
-                    <a:srgbClr val="FFFFFF"/>
-                  </a:gs>
-                </a:gsLst>
-                <a:lin ang="5400000" scaled="0"/>
-              </a:gradFill>
-              <a:ea typeface="Segoe UI" pitchFamily="34" charset="0"/>
-              <a:cs typeface="Segoe UI" pitchFamily="34" charset="0"/>
-            </a:endParaRPr>
           </a:p>
         </p:txBody>
       </p:sp>
@@ -38355,14 +38325,6 @@
               </a:rPr>
               <a:t>32</a:t>
             </a:r>
-            <a:endParaRPr lang="en-US" sz="3200" dirty="0" smtClean="0">
-              <a:solidFill>
-                <a:schemeClr val="accent1">
-                  <a:lumMod val="75000"/>
-                </a:schemeClr>
-              </a:solidFill>
-              <a:latin typeface="Consolas" panose="020B0609020204030204" pitchFamily="49" charset="0"/>
-            </a:endParaRPr>
           </a:p>
         </p:txBody>
       </p:sp>
@@ -38482,21 +38444,6 @@
               </a:rPr>
               <a:t> now!</a:t>
             </a:r>
-            <a:endParaRPr lang="en-US" sz="3200" dirty="0" smtClean="0">
-              <a:gradFill>
-                <a:gsLst>
-                  <a:gs pos="0">
-                    <a:srgbClr val="FFFFFF"/>
-                  </a:gs>
-                  <a:gs pos="100000">
-                    <a:srgbClr val="FFFFFF"/>
-                  </a:gs>
-                </a:gsLst>
-                <a:lin ang="5400000" scaled="0"/>
-              </a:gradFill>
-              <a:ea typeface="Segoe UI" pitchFamily="34" charset="0"/>
-              <a:cs typeface="Segoe UI" pitchFamily="34" charset="0"/>
-            </a:endParaRPr>
           </a:p>
         </p:txBody>
       </p:sp>
@@ -38592,14 +38539,6 @@
               </a:rPr>
               <a:t>33</a:t>
             </a:r>
-            <a:endParaRPr lang="en-US" sz="3200" dirty="0" smtClean="0">
-              <a:solidFill>
-                <a:schemeClr val="accent1">
-                  <a:lumMod val="75000"/>
-                </a:schemeClr>
-              </a:solidFill>
-              <a:latin typeface="Consolas" panose="020B0609020204030204" pitchFamily="49" charset="0"/>
-            </a:endParaRPr>
           </a:p>
         </p:txBody>
       </p:sp>
@@ -38649,19 +38588,6 @@
               </a:rPr>
               <a:t>Computer</a:t>
             </a:r>
-            <a:endParaRPr lang="en-US" sz="2400" dirty="0" smtClean="0">
-              <a:gradFill>
-                <a:gsLst>
-                  <a:gs pos="2917">
-                    <a:schemeClr val="tx1"/>
-                  </a:gs>
-                  <a:gs pos="30000">
-                    <a:schemeClr val="tx1"/>
-                  </a:gs>
-                </a:gsLst>
-                <a:lin ang="5400000" scaled="0"/>
-              </a:gradFill>
-            </a:endParaRPr>
           </a:p>
         </p:txBody>
       </p:sp>
@@ -38711,19 +38637,6 @@
               </a:rPr>
               <a:t>User</a:t>
             </a:r>
-            <a:endParaRPr lang="en-US" sz="2400" dirty="0" smtClean="0">
-              <a:gradFill>
-                <a:gsLst>
-                  <a:gs pos="2917">
-                    <a:schemeClr val="tx1"/>
-                  </a:gs>
-                  <a:gs pos="30000">
-                    <a:schemeClr val="tx1"/>
-                  </a:gs>
-                </a:gsLst>
-                <a:lin ang="5400000" scaled="0"/>
-              </a:gradFill>
-            </a:endParaRPr>
           </a:p>
         </p:txBody>
       </p:sp>

</xml_diff>